<commit_message>
v002 Added test slides
</commit_message>
<xml_diff>
--- a/ECE_PlaidTemplate_v002.pptx
+++ b/ECE_PlaidTemplate_v002.pptx
@@ -5,28 +5,29 @@
     <p:sldMasterId id="2147483669" r:id="rId1"/>
   </p:sldMasterIdLst>
   <p:notesMasterIdLst>
-    <p:notesMasterId r:id="rId4"/>
+    <p:notesMasterId r:id="rId5"/>
   </p:notesMasterIdLst>
   <p:sldIdLst>
-    <p:sldId id="257" r:id="rId2"/>
-    <p:sldId id="258" r:id="rId3"/>
+    <p:sldId id="258" r:id="rId2"/>
+    <p:sldId id="257" r:id="rId3"/>
+    <p:sldId id="259" r:id="rId4"/>
   </p:sldIdLst>
   <p:sldSz cx="12192000" cy="6858000"/>
   <p:notesSz cx="6858000" cy="9144000"/>
   <p:embeddedFontLst>
     <p:embeddedFont>
       <p:font typeface="Open Sans" panose="020B0606030504020204" pitchFamily="34" charset="0"/>
-      <p:regular r:id="rId5"/>
-      <p:bold r:id="rId6"/>
-      <p:italic r:id="rId7"/>
-      <p:boldItalic r:id="rId8"/>
+      <p:regular r:id="rId6"/>
+      <p:bold r:id="rId7"/>
+      <p:italic r:id="rId8"/>
+      <p:boldItalic r:id="rId9"/>
     </p:embeddedFont>
     <p:embeddedFont>
       <p:font typeface="Open Sans Light" panose="020B0306030504020204" pitchFamily="34" charset="0"/>
-      <p:regular r:id="rId9"/>
-      <p:bold r:id="rId10"/>
-      <p:italic r:id="rId11"/>
-      <p:boldItalic r:id="rId12"/>
+      <p:regular r:id="rId10"/>
+      <p:bold r:id="rId11"/>
+      <p:italic r:id="rId12"/>
+      <p:boldItalic r:id="rId13"/>
     </p:embeddedFont>
   </p:embeddedFontLst>
   <p:defaultTextStyle>
@@ -1041,7 +1042,7 @@
           <a:p>
             <a:fld id="{70739568-309E-4CDD-B1CE-D0F106271ECE}" type="datetimeFigureOut">
               <a:rPr lang="en-US" smtClean="0"/>
-              <a:t>11/19/2022</a:t>
+              <a:t>11/26/2022</a:t>
             </a:fld>
             <a:endParaRPr lang="en-US"/>
           </a:p>
@@ -1291,7 +1292,7 @@
           <a:p>
             <a:fld id="{70739568-309E-4CDD-B1CE-D0F106271ECE}" type="datetimeFigureOut">
               <a:rPr lang="en-US" smtClean="0"/>
-              <a:t>11/19/2022</a:t>
+              <a:t>11/26/2022</a:t>
             </a:fld>
             <a:endParaRPr lang="en-US"/>
           </a:p>
@@ -1446,7 +1447,7 @@
           <a:p>
             <a:fld id="{70739568-309E-4CDD-B1CE-D0F106271ECE}" type="datetimeFigureOut">
               <a:rPr lang="en-US" smtClean="0"/>
-              <a:t>11/19/2022</a:t>
+              <a:t>11/26/2022</a:t>
             </a:fld>
             <a:endParaRPr lang="en-US"/>
           </a:p>
@@ -1692,7 +1693,7 @@
           <a:p>
             <a:fld id="{70739568-309E-4CDD-B1CE-D0F106271ECE}" type="datetimeFigureOut">
               <a:rPr lang="en-US" smtClean="0"/>
-              <a:t>11/19/2022</a:t>
+              <a:t>11/26/2022</a:t>
             </a:fld>
             <a:endParaRPr lang="en-US"/>
           </a:p>
@@ -2247,7 +2248,7 @@
           <a:p>
             <a:fld id="{70739568-309E-4CDD-B1CE-D0F106271ECE}" type="datetimeFigureOut">
               <a:rPr lang="en-US" smtClean="0"/>
-              <a:t>11/19/2022</a:t>
+              <a:t>11/26/2022</a:t>
             </a:fld>
             <a:endParaRPr lang="en-US"/>
           </a:p>
@@ -3096,10 +3097,10 @@
       </p:grpSpPr>
       <p:sp>
         <p:nvSpPr>
-          <p:cNvPr id="3" name="Title 2">
+          <p:cNvPr id="5" name="Title 4">
             <a:extLst>
               <a:ext uri="{FF2B5EF4-FFF2-40B4-BE49-F238E27FC236}">
-                <a16:creationId xmlns:a16="http://schemas.microsoft.com/office/drawing/2014/main" id="{1376C1A0-444F-2004-9DE3-8FF19EF75B5D}"/>
+                <a16:creationId xmlns:a16="http://schemas.microsoft.com/office/drawing/2014/main" id="{37F2479C-50B7-00E0-C6D4-3B7B866735A7}"/>
               </a:ext>
             </a:extLst>
           </p:cNvPr>
@@ -3112,19 +3113,31 @@
         </p:nvSpPr>
         <p:spPr/>
         <p:txBody>
-          <a:bodyPr/>
+          <a:bodyPr anchor="t">
+            <a:noAutofit/>
+          </a:bodyPr>
           <a:lstStyle/>
           <a:p>
-            <a:endParaRPr lang="en-US"/>
+            <a:r>
+              <a:rPr lang="en-US" dirty="0"/>
+              <a:t>Test of This Layout</a:t>
+            </a:r>
+            <a:br>
+              <a:rPr lang="en-US" dirty="0"/>
+            </a:br>
+            <a:r>
+              <a:rPr lang="en-US" dirty="0"/>
+              <a:t>Test of This Layout</a:t>
+            </a:r>
           </a:p>
         </p:txBody>
       </p:sp>
       <p:sp>
         <p:nvSpPr>
-          <p:cNvPr id="4" name="Content Placeholder 3">
+          <p:cNvPr id="6" name="Text Placeholder 5">
             <a:extLst>
               <a:ext uri="{FF2B5EF4-FFF2-40B4-BE49-F238E27FC236}">
-                <a16:creationId xmlns:a16="http://schemas.microsoft.com/office/drawing/2014/main" id="{A2F0936F-15C0-4F4A-5CB6-198258BC5093}"/>
+                <a16:creationId xmlns:a16="http://schemas.microsoft.com/office/drawing/2014/main" id="{5EEA51E1-8500-3AA7-3537-A8A35C651353}"/>
               </a:ext>
             </a:extLst>
           </p:cNvPr>
@@ -3132,7 +3145,7 @@
             <a:spLocks noGrp="1"/>
           </p:cNvSpPr>
           <p:nvPr>
-            <p:ph idx="1"/>
+            <p:ph type="body" sz="quarter" idx="10"/>
           </p:nvPr>
         </p:nvSpPr>
         <p:spPr/>
@@ -3140,14 +3153,67 @@
           <a:bodyPr/>
           <a:lstStyle/>
           <a:p>
-            <a:endParaRPr lang="en-US"/>
+            <a:r>
+              <a:rPr lang="en-US" dirty="0"/>
+              <a:t>Test of This Layout</a:t>
+            </a:r>
+            <a:br>
+              <a:rPr lang="en-US" dirty="0"/>
+            </a:br>
+            <a:r>
+              <a:rPr lang="en-US" dirty="0"/>
+              <a:t>Test of This Layout</a:t>
+            </a:r>
+          </a:p>
+        </p:txBody>
+      </p:sp>
+      <p:sp>
+        <p:nvSpPr>
+          <p:cNvPr id="3" name="Slide Number Placeholder 2">
+            <a:extLst>
+              <a:ext uri="{FF2B5EF4-FFF2-40B4-BE49-F238E27FC236}">
+                <a16:creationId xmlns:a16="http://schemas.microsoft.com/office/drawing/2014/main" id="{88653C8F-7F44-A027-A465-9BC7122AFF9F}"/>
+              </a:ext>
+            </a:extLst>
+          </p:cNvPr>
+          <p:cNvSpPr>
+            <a:spLocks noGrp="1"/>
+          </p:cNvSpPr>
+          <p:nvPr>
+            <p:ph type="sldNum" idx="4294967295"/>
+          </p:nvPr>
+        </p:nvSpPr>
+        <p:spPr>
+          <a:xfrm>
+            <a:off x="0" y="6237288"/>
+            <a:ext cx="322263" cy="365125"/>
+          </a:xfrm>
+        </p:spPr>
+        <p:txBody>
+          <a:bodyPr/>
+          <a:lstStyle/>
+          <a:p>
+            <a:pPr marL="0" lvl="0" indent="0" algn="r" rtl="0">
+              <a:spcBef>
+                <a:spcPts val="0"/>
+              </a:spcBef>
+              <a:spcAft>
+                <a:spcPts val="0"/>
+              </a:spcAft>
+              <a:buNone/>
+            </a:pPr>
+            <a:fld id="{00000000-1234-1234-1234-123412341234}" type="slidenum">
+              <a:rPr lang="en-US" smtClean="0"/>
+              <a:t>1</a:t>
+            </a:fld>
+            <a:endParaRPr lang="en-US" dirty="0"/>
           </a:p>
         </p:txBody>
       </p:sp>
     </p:spTree>
     <p:extLst>
       <p:ext uri="{BB962C8B-B14F-4D97-AF65-F5344CB8AC3E}">
-        <p14:creationId xmlns:p14="http://schemas.microsoft.com/office/powerpoint/2010/main" val="2156560494"/>
+        <p14:creationId xmlns:p14="http://schemas.microsoft.com/office/powerpoint/2010/main" val="1201654095"/>
       </p:ext>
     </p:extLst>
   </p:cSld>
@@ -3176,10 +3242,10 @@
       </p:grpSpPr>
       <p:sp>
         <p:nvSpPr>
-          <p:cNvPr id="5" name="Title 4">
+          <p:cNvPr id="3" name="Title 2">
             <a:extLst>
               <a:ext uri="{FF2B5EF4-FFF2-40B4-BE49-F238E27FC236}">
-                <a16:creationId xmlns:a16="http://schemas.microsoft.com/office/drawing/2014/main" id="{37F2479C-50B7-00E0-C6D4-3B7B866735A7}"/>
+                <a16:creationId xmlns:a16="http://schemas.microsoft.com/office/drawing/2014/main" id="{1376C1A0-444F-2004-9DE3-8FF19EF75B5D}"/>
               </a:ext>
             </a:extLst>
           </p:cNvPr>
@@ -3192,35 +3258,19 @@
         </p:nvSpPr>
         <p:spPr/>
         <p:txBody>
-          <a:bodyPr anchor="t">
-            <a:noAutofit/>
-          </a:bodyPr>
+          <a:bodyPr/>
           <a:lstStyle/>
           <a:p>
-            <a:r>
-              <a:rPr lang="en-US" dirty="0"/>
-              <a:t>Test of This Layout</a:t>
-            </a:r>
-            <a:br>
-              <a:rPr lang="en-US" dirty="0"/>
-            </a:br>
-            <a:r>
-              <a:rPr lang="en-US" dirty="0"/>
-              <a:t>Test</a:t>
-            </a:r>
-            <a:br>
-              <a:rPr lang="en-US" dirty="0"/>
-            </a:br>
-            <a:endParaRPr lang="en-US" dirty="0"/>
+            <a:endParaRPr lang="en-US"/>
           </a:p>
         </p:txBody>
       </p:sp>
       <p:sp>
         <p:nvSpPr>
-          <p:cNvPr id="6" name="Text Placeholder 5">
+          <p:cNvPr id="4" name="Content Placeholder 3">
             <a:extLst>
               <a:ext uri="{FF2B5EF4-FFF2-40B4-BE49-F238E27FC236}">
-                <a16:creationId xmlns:a16="http://schemas.microsoft.com/office/drawing/2014/main" id="{5EEA51E1-8500-3AA7-3537-A8A35C651353}"/>
+                <a16:creationId xmlns:a16="http://schemas.microsoft.com/office/drawing/2014/main" id="{A2F0936F-15C0-4F4A-5CB6-198258BC5093}"/>
               </a:ext>
             </a:extLst>
           </p:cNvPr>
@@ -3228,7 +3278,128 @@
             <a:spLocks noGrp="1"/>
           </p:cNvSpPr>
           <p:nvPr>
-            <p:ph type="body" sz="quarter" idx="10"/>
+            <p:ph idx="1"/>
+          </p:nvPr>
+        </p:nvSpPr>
+        <p:spPr/>
+        <p:txBody>
+          <a:bodyPr/>
+          <a:lstStyle/>
+          <a:p>
+            <a:r>
+              <a:rPr lang="en-US" dirty="0"/>
+              <a:t>Test of this layout</a:t>
+            </a:r>
+            <a:br>
+              <a:rPr lang="en-US" dirty="0"/>
+            </a:br>
+            <a:r>
+              <a:rPr lang="en-US" dirty="0"/>
+              <a:t>Test of this layout</a:t>
+            </a:r>
+          </a:p>
+          <a:p>
+            <a:pPr lvl="1"/>
+            <a:r>
+              <a:rPr lang="en-US" dirty="0"/>
+              <a:t>Test of this layout</a:t>
+            </a:r>
+            <a:br>
+              <a:rPr lang="en-US" dirty="0"/>
+            </a:br>
+            <a:r>
+              <a:rPr lang="en-US" dirty="0"/>
+              <a:t>Test of this layout</a:t>
+            </a:r>
+          </a:p>
+          <a:p>
+            <a:pPr lvl="2"/>
+            <a:r>
+              <a:rPr lang="en-US" dirty="0"/>
+              <a:t>Test of this layout</a:t>
+            </a:r>
+            <a:br>
+              <a:rPr lang="en-US" dirty="0"/>
+            </a:br>
+            <a:r>
+              <a:rPr lang="en-US" dirty="0"/>
+              <a:t>Test of this layout</a:t>
+            </a:r>
+          </a:p>
+          <a:p>
+            <a:pPr lvl="3"/>
+            <a:r>
+              <a:rPr lang="en-US" dirty="0"/>
+              <a:t>Test of this layout</a:t>
+            </a:r>
+            <a:br>
+              <a:rPr lang="en-US" dirty="0"/>
+            </a:br>
+            <a:r>
+              <a:rPr lang="en-US" dirty="0"/>
+              <a:t>Test of this layout</a:t>
+            </a:r>
+          </a:p>
+          <a:p>
+            <a:pPr lvl="4"/>
+            <a:r>
+              <a:rPr lang="en-US" dirty="0"/>
+              <a:t>Test of this layout </a:t>
+            </a:r>
+            <a:br>
+              <a:rPr lang="en-US" dirty="0"/>
+            </a:br>
+            <a:r>
+              <a:rPr lang="en-US" dirty="0"/>
+              <a:t>Test of this layout</a:t>
+            </a:r>
+          </a:p>
+        </p:txBody>
+      </p:sp>
+    </p:spTree>
+    <p:extLst>
+      <p:ext uri="{BB962C8B-B14F-4D97-AF65-F5344CB8AC3E}">
+        <p14:creationId xmlns:p14="http://schemas.microsoft.com/office/powerpoint/2010/main" val="2156560494"/>
+      </p:ext>
+    </p:extLst>
+  </p:cSld>
+  <p:clrMapOvr>
+    <a:masterClrMapping/>
+  </p:clrMapOvr>
+</p:sld>
+</file>
+
+<file path=ppt/slides/slide3.xml><?xml version="1.0" encoding="utf-8"?>
+<p:sld xmlns:a="http://schemas.openxmlformats.org/drawingml/2006/main" xmlns:r="http://schemas.openxmlformats.org/officeDocument/2006/relationships" xmlns:p="http://schemas.openxmlformats.org/presentationml/2006/main">
+  <p:cSld>
+    <p:spTree>
+      <p:nvGrpSpPr>
+        <p:cNvPr id="1" name=""/>
+        <p:cNvGrpSpPr/>
+        <p:nvPr/>
+      </p:nvGrpSpPr>
+      <p:grpSpPr>
+        <a:xfrm>
+          <a:off x="0" y="0"/>
+          <a:ext cx="0" cy="0"/>
+          <a:chOff x="0" y="0"/>
+          <a:chExt cx="0" cy="0"/>
+        </a:xfrm>
+      </p:grpSpPr>
+      <p:sp>
+        <p:nvSpPr>
+          <p:cNvPr id="5" name="Title 4">
+            <a:extLst>
+              <a:ext uri="{FF2B5EF4-FFF2-40B4-BE49-F238E27FC236}">
+                <a16:creationId xmlns:a16="http://schemas.microsoft.com/office/drawing/2014/main" id="{76149469-4956-910C-6012-A2CA2002D6C3}"/>
+              </a:ext>
+            </a:extLst>
+          </p:cNvPr>
+          <p:cNvSpPr>
+            <a:spLocks noGrp="1"/>
+          </p:cNvSpPr>
+          <p:nvPr>
+            <p:ph type="title"/>
           </p:nvPr>
         </p:nvSpPr>
         <p:spPr/>
@@ -3245,7 +3416,7 @@
           <p:cNvPr id="3" name="Slide Number Placeholder 2">
             <a:extLst>
               <a:ext uri="{FF2B5EF4-FFF2-40B4-BE49-F238E27FC236}">
-                <a16:creationId xmlns:a16="http://schemas.microsoft.com/office/drawing/2014/main" id="{88653C8F-7F44-A027-A465-9BC7122AFF9F}"/>
+                <a16:creationId xmlns:a16="http://schemas.microsoft.com/office/drawing/2014/main" id="{D5CD2D7C-56AD-8925-FA26-048AB548E91B}"/>
               </a:ext>
             </a:extLst>
           </p:cNvPr>
@@ -3253,15 +3424,10 @@
             <a:spLocks noGrp="1"/>
           </p:cNvSpPr>
           <p:nvPr>
-            <p:ph type="sldNum" idx="4294967295"/>
+            <p:ph type="sldNum" idx="10"/>
           </p:nvPr>
         </p:nvSpPr>
-        <p:spPr>
-          <a:xfrm>
-            <a:off x="0" y="6237288"/>
-            <a:ext cx="322263" cy="365125"/>
-          </a:xfrm>
-        </p:spPr>
+        <p:spPr/>
         <p:txBody>
           <a:bodyPr/>
           <a:lstStyle/>
@@ -3277,7 +3443,7 @@
             </a:pPr>
             <a:fld id="{00000000-1234-1234-1234-123412341234}" type="slidenum">
               <a:rPr lang="en-US" smtClean="0"/>
-              <a:t>2</a:t>
+              <a:t>3</a:t>
             </a:fld>
             <a:endParaRPr lang="en-US" dirty="0"/>
           </a:p>
@@ -3286,7 +3452,7 @@
     </p:spTree>
     <p:extLst>
       <p:ext uri="{BB962C8B-B14F-4D97-AF65-F5344CB8AC3E}">
-        <p14:creationId xmlns:p14="http://schemas.microsoft.com/office/powerpoint/2010/main" val="1201654095"/>
+        <p14:creationId xmlns:p14="http://schemas.microsoft.com/office/powerpoint/2010/main" val="847938346"/>
       </p:ext>
     </p:extLst>
   </p:cSld>

</xml_diff>